<commit_message>
Updated profile one page ppt
</commit_message>
<xml_diff>
--- a/p/pro/Ranjan-Sharma-Profile V 1.0.pptx
+++ b/p/pro/Ranjan-Sharma-Profile V 1.0.pptx
@@ -197,7 +197,7 @@
           <a:p>
             <a:fld id="{81255D54-DCC7-4AEA-9A0D-ADE65BFAD0FD}" type="datetimeFigureOut">
               <a:rPr lang="en-US" smtClean="0"/>
-              <a:t>9/3/2024</a:t>
+              <a:t>9/9/2024</a:t>
             </a:fld>
             <a:endParaRPr lang="en-US"/>
           </a:p>
@@ -695,7 +695,7 @@
           <a:p>
             <a:fld id="{92AA035B-E45D-4D8B-A5AD-8F56B5D9C378}" type="datetimeFigureOut">
               <a:rPr lang="en-US" smtClean="0"/>
-              <a:t>9/3/2024</a:t>
+              <a:t>9/9/2024</a:t>
             </a:fld>
             <a:endParaRPr lang="en-US"/>
           </a:p>
@@ -893,7 +893,7 @@
           <a:p>
             <a:fld id="{92AA035B-E45D-4D8B-A5AD-8F56B5D9C378}" type="datetimeFigureOut">
               <a:rPr lang="en-US" smtClean="0"/>
-              <a:t>9/3/2024</a:t>
+              <a:t>9/9/2024</a:t>
             </a:fld>
             <a:endParaRPr lang="en-US"/>
           </a:p>
@@ -1101,7 +1101,7 @@
           <a:p>
             <a:fld id="{92AA035B-E45D-4D8B-A5AD-8F56B5D9C378}" type="datetimeFigureOut">
               <a:rPr lang="en-US" smtClean="0"/>
-              <a:t>9/3/2024</a:t>
+              <a:t>9/9/2024</a:t>
             </a:fld>
             <a:endParaRPr lang="en-US"/>
           </a:p>
@@ -1299,7 +1299,7 @@
           <a:p>
             <a:fld id="{92AA035B-E45D-4D8B-A5AD-8F56B5D9C378}" type="datetimeFigureOut">
               <a:rPr lang="en-US" smtClean="0"/>
-              <a:t>9/3/2024</a:t>
+              <a:t>9/9/2024</a:t>
             </a:fld>
             <a:endParaRPr lang="en-US"/>
           </a:p>
@@ -1574,7 +1574,7 @@
           <a:p>
             <a:fld id="{92AA035B-E45D-4D8B-A5AD-8F56B5D9C378}" type="datetimeFigureOut">
               <a:rPr lang="en-US" smtClean="0"/>
-              <a:t>9/3/2024</a:t>
+              <a:t>9/9/2024</a:t>
             </a:fld>
             <a:endParaRPr lang="en-US"/>
           </a:p>
@@ -1839,7 +1839,7 @@
           <a:p>
             <a:fld id="{92AA035B-E45D-4D8B-A5AD-8F56B5D9C378}" type="datetimeFigureOut">
               <a:rPr lang="en-US" smtClean="0"/>
-              <a:t>9/3/2024</a:t>
+              <a:t>9/9/2024</a:t>
             </a:fld>
             <a:endParaRPr lang="en-US"/>
           </a:p>
@@ -2251,7 +2251,7 @@
           <a:p>
             <a:fld id="{92AA035B-E45D-4D8B-A5AD-8F56B5D9C378}" type="datetimeFigureOut">
               <a:rPr lang="en-US" smtClean="0"/>
-              <a:t>9/3/2024</a:t>
+              <a:t>9/9/2024</a:t>
             </a:fld>
             <a:endParaRPr lang="en-US"/>
           </a:p>
@@ -2392,7 +2392,7 @@
           <a:p>
             <a:fld id="{92AA035B-E45D-4D8B-A5AD-8F56B5D9C378}" type="datetimeFigureOut">
               <a:rPr lang="en-US" smtClean="0"/>
-              <a:t>9/3/2024</a:t>
+              <a:t>9/9/2024</a:t>
             </a:fld>
             <a:endParaRPr lang="en-US"/>
           </a:p>
@@ -2505,7 +2505,7 @@
           <a:p>
             <a:fld id="{92AA035B-E45D-4D8B-A5AD-8F56B5D9C378}" type="datetimeFigureOut">
               <a:rPr lang="en-US" smtClean="0"/>
-              <a:t>9/3/2024</a:t>
+              <a:t>9/9/2024</a:t>
             </a:fld>
             <a:endParaRPr lang="en-US"/>
           </a:p>
@@ -2816,7 +2816,7 @@
           <a:p>
             <a:fld id="{92AA035B-E45D-4D8B-A5AD-8F56B5D9C378}" type="datetimeFigureOut">
               <a:rPr lang="en-US" smtClean="0"/>
-              <a:t>9/3/2024</a:t>
+              <a:t>9/9/2024</a:t>
             </a:fld>
             <a:endParaRPr lang="en-US"/>
           </a:p>
@@ -3104,7 +3104,7 @@
           <a:p>
             <a:fld id="{92AA035B-E45D-4D8B-A5AD-8F56B5D9C378}" type="datetimeFigureOut">
               <a:rPr lang="en-US" smtClean="0"/>
-              <a:t>9/3/2024</a:t>
+              <a:t>9/9/2024</a:t>
             </a:fld>
             <a:endParaRPr lang="en-US"/>
           </a:p>
@@ -3345,7 +3345,7 @@
           <a:p>
             <a:fld id="{92AA035B-E45D-4D8B-A5AD-8F56B5D9C378}" type="datetimeFigureOut">
               <a:rPr lang="en-US" smtClean="0"/>
-              <a:t>9/3/2024</a:t>
+              <a:t>9/9/2024</a:t>
             </a:fld>
             <a:endParaRPr lang="en-US"/>
           </a:p>
@@ -4047,7 +4047,7 @@
         </p:nvGrpSpPr>
         <p:grpSpPr>
           <a:xfrm>
-            <a:off x="2490488" y="2915083"/>
+            <a:off x="2490488" y="2782080"/>
             <a:ext cx="1682876" cy="1130769"/>
             <a:chOff x="2985497" y="3496439"/>
             <a:chExt cx="1682876" cy="1018021"/>
@@ -4251,7 +4251,7 @@
         </p:nvGrpSpPr>
         <p:grpSpPr>
           <a:xfrm>
-            <a:off x="2519981" y="718252"/>
+            <a:off x="2519981" y="585247"/>
             <a:ext cx="1680002" cy="1630595"/>
             <a:chOff x="3002885" y="1447149"/>
             <a:chExt cx="1680002" cy="1415442"/>
@@ -4451,8 +4451,8 @@
         </p:nvSpPr>
         <p:spPr bwMode="auto">
           <a:xfrm>
-            <a:off x="4173364" y="639290"/>
-            <a:ext cx="7822418" cy="2123658"/>
+            <a:off x="4173364" y="590307"/>
+            <a:ext cx="7822418" cy="1938992"/>
           </a:xfrm>
           <a:prstGeom prst="rect">
             <a:avLst/>
@@ -4493,7 +4493,7 @@
                 <a:ea typeface="Times New Roman" panose="02020603050405020304" pitchFamily="18" charset="0"/>
                 <a:cs typeface="Calibri" panose="020F0502020204030204" pitchFamily="34" charset="0"/>
               </a:rPr>
-              <a:t>in IT in Development for multiple mobile and web platform using Python, Node.js, PHP with web frameworks such as React JS, Angular, etc.</a:t>
+              <a:t>in IT in Development for multiple mobile and web platform using Python, Node.js, PHP with web frameworks such as Angular, React, Ionic, React Native, Bootstrap, Cordova, Electron JS, etc.</a:t>
             </a:r>
           </a:p>
           <a:p>
@@ -4608,35 +4608,7 @@
                 <a:ea typeface="Times New Roman" panose="02020603050405020304" pitchFamily="18" charset="0"/>
                 <a:cs typeface="Calibri" panose="020F0502020204030204" pitchFamily="34" charset="0"/>
               </a:rPr>
-              <a:t>Hands on experiences for databases Oracle, Mongo DB, Redis, MYSQL, DynamoDB, Cosmos DB and Indexed DB.</a:t>
-            </a:r>
-          </a:p>
-          <a:p>
-            <a:pPr marL="171450" lvl="0" indent="-171450">
-              <a:buFont typeface="Arial" panose="020B0604020202020204" pitchFamily="34" charset="0"/>
-              <a:buChar char="•"/>
-            </a:pPr>
-            <a:r>
-              <a:rPr lang="en-US" sz="1200" dirty="0">
-                <a:latin typeface="Calibri" panose="020F0502020204030204" pitchFamily="34" charset="0"/>
-                <a:ea typeface="Times New Roman" panose="02020603050405020304" pitchFamily="18" charset="0"/>
-                <a:cs typeface="Calibri" panose="020F0502020204030204" pitchFamily="34" charset="0"/>
-              </a:rPr>
-              <a:t>Expertise in implementing MVC Design pattern in .NET Projects.</a:t>
-            </a:r>
-          </a:p>
-          <a:p>
-            <a:pPr marL="171450" lvl="0" indent="-171450">
-              <a:buFont typeface="Arial" panose="020B0604020202020204" pitchFamily="34" charset="0"/>
-              <a:buChar char="•"/>
-            </a:pPr>
-            <a:r>
-              <a:rPr lang="en-US" sz="1200" dirty="0">
-                <a:latin typeface="Calibri" panose="020F0502020204030204" pitchFamily="34" charset="0"/>
-                <a:ea typeface="Times New Roman" panose="02020603050405020304" pitchFamily="18" charset="0"/>
-                <a:cs typeface="Calibri" panose="020F0502020204030204" pitchFamily="34" charset="0"/>
-              </a:rPr>
-              <a:t>Experience in developing complete microservice architecture using AWS Cloud Formation, Step functions and serverless Lambda function to maintain application performance by dividing less used features to microservices.</a:t>
+              <a:t>Hands on experiences for databases Oracle, Mongo DB, Redis, MYSQL, DynamoDB, Cosmos DB and Indexed DB. Experience in developing complete microservice architecture using AWS Cloud Formation, Step functions and serverless Lambda function to maintain application performance by dividing less used features to microservices.</a:t>
             </a:r>
             <a:endParaRPr lang="en-US" sz="1200" dirty="0">
               <a:solidFill>
@@ -4695,6 +4667,17 @@
               <a:defRPr/>
             </a:pPr>
             <a:r>
+              <a:rPr lang="en-US" sz="1200" b="1" dirty="0">
+                <a:solidFill>
+                  <a:srgbClr val="000000"/>
+                </a:solidFill>
+                <a:latin typeface="Calibri" panose="020F0502020204030204" pitchFamily="34" charset="0"/>
+                <a:ea typeface="Calibri" panose="020F0502020204030204" pitchFamily="34" charset="0"/>
+                <a:cs typeface="Calibri" panose="020F0502020204030204" pitchFamily="34" charset="0"/>
+              </a:rPr>
+              <a:t>CCNA and MCSC certification training</a:t>
+            </a:r>
+            <a:r>
               <a:rPr lang="en-US" sz="1200" dirty="0">
                 <a:solidFill>
                   <a:srgbClr val="000000"/>
@@ -4703,7 +4686,7 @@
                 <a:ea typeface="Calibri" panose="020F0502020204030204" pitchFamily="34" charset="0"/>
                 <a:cs typeface="Calibri" panose="020F0502020204030204" pitchFamily="34" charset="0"/>
               </a:rPr>
-              <a:t>CCNA and MCSC certification training, ASET Delhi, 2010</a:t>
+              <a:t>, ASET Delhi, 2010</a:t>
             </a:r>
           </a:p>
           <a:p>
@@ -4713,6 +4696,17 @@
               <a:defRPr/>
             </a:pPr>
             <a:r>
+              <a:rPr lang="en-US" sz="1200" b="1" dirty="0">
+                <a:solidFill>
+                  <a:srgbClr val="000000"/>
+                </a:solidFill>
+                <a:latin typeface="Calibri" panose="020F0502020204030204" pitchFamily="34" charset="0"/>
+                <a:ea typeface="Calibri" panose="020F0502020204030204" pitchFamily="34" charset="0"/>
+                <a:cs typeface="Calibri" panose="020F0502020204030204" pitchFamily="34" charset="0"/>
+              </a:rPr>
+              <a:t>Hardware and Networking Diploma</a:t>
+            </a:r>
+            <a:r>
               <a:rPr lang="en-US" sz="1200" dirty="0">
                 <a:solidFill>
                   <a:srgbClr val="000000"/>
@@ -4721,7 +4715,7 @@
                 <a:ea typeface="Calibri" panose="020F0502020204030204" pitchFamily="34" charset="0"/>
                 <a:cs typeface="Calibri" panose="020F0502020204030204" pitchFamily="34" charset="0"/>
               </a:rPr>
-              <a:t>Hardware and Networking Diploma, ASET Delhi, 2010</a:t>
+              <a:t>, ASET Delhi, 2010</a:t>
             </a:r>
           </a:p>
           <a:p>
@@ -4731,13 +4725,22 @@
               <a:defRPr/>
             </a:pPr>
             <a:r>
+              <a:rPr lang="en-US" sz="1200" b="1" dirty="0">
+                <a:effectLst/>
+                <a:latin typeface="Calibri" panose="020F0502020204030204" pitchFamily="34" charset="0"/>
+                <a:ea typeface="Calibri" panose="020F0502020204030204" pitchFamily="34" charset="0"/>
+                <a:cs typeface="Calibri" panose="020F0502020204030204" pitchFamily="34" charset="0"/>
+              </a:rPr>
+              <a:t>Bachelor of Computer Applications</a:t>
+            </a:r>
+            <a:r>
               <a:rPr lang="en-US" sz="1200" dirty="0">
                 <a:effectLst/>
                 <a:latin typeface="Calibri" panose="020F0502020204030204" pitchFamily="34" charset="0"/>
                 <a:ea typeface="Calibri" panose="020F0502020204030204" pitchFamily="34" charset="0"/>
                 <a:cs typeface="Calibri" panose="020F0502020204030204" pitchFamily="34" charset="0"/>
               </a:rPr>
-              <a:t>Bachelor of Computer Applications, Delhi Rajghat, Indira Gandhi National Open University (I.G.N.O.U) 2015</a:t>
+              <a:t>, Delhi Rajghat, Indira Gandhi National Open University (I.G.N.O.U) 2015</a:t>
             </a:r>
           </a:p>
           <a:p>
@@ -4785,7 +4788,29 @@
                 <a:ea typeface="Calibri" panose="020F0502020204030204" pitchFamily="34" charset="0"/>
                 <a:cs typeface="Calibri" panose="020F0502020204030204" pitchFamily="34" charset="0"/>
               </a:rPr>
-              <a:t>Strong experience in End to End Application with Cloud and Mobile application performance skills</a:t>
+              <a:t>Strong experience in End to End Application with </a:t>
+            </a:r>
+            <a:r>
+              <a:rPr lang="en-US" sz="1200" b="1" dirty="0">
+                <a:solidFill>
+                  <a:srgbClr val="000000"/>
+                </a:solidFill>
+                <a:latin typeface="Calibri" panose="020F0502020204030204" pitchFamily="34" charset="0"/>
+                <a:ea typeface="Calibri" panose="020F0502020204030204" pitchFamily="34" charset="0"/>
+                <a:cs typeface="Calibri" panose="020F0502020204030204" pitchFamily="34" charset="0"/>
+              </a:rPr>
+              <a:t>Cloud and Mobile application performance </a:t>
+            </a:r>
+            <a:r>
+              <a:rPr lang="en-US" sz="1200" dirty="0">
+                <a:solidFill>
+                  <a:srgbClr val="000000"/>
+                </a:solidFill>
+                <a:latin typeface="Calibri" panose="020F0502020204030204" pitchFamily="34" charset="0"/>
+                <a:ea typeface="Calibri" panose="020F0502020204030204" pitchFamily="34" charset="0"/>
+                <a:cs typeface="Calibri" panose="020F0502020204030204" pitchFamily="34" charset="0"/>
+              </a:rPr>
+              <a:t>skills</a:t>
             </a:r>
           </a:p>
           <a:p>
@@ -4868,8 +4893,8 @@
         </p:nvSpPr>
         <p:spPr>
           <a:xfrm>
-            <a:off x="4192505" y="2800713"/>
-            <a:ext cx="7822418" cy="1938992"/>
+            <a:off x="4192505" y="2684335"/>
+            <a:ext cx="7822418" cy="2123658"/>
           </a:xfrm>
           <a:prstGeom prst="rect">
             <a:avLst/>
@@ -4916,7 +4941,25 @@
                 <a:ea typeface="Times New Roman" panose="02020603050405020304" pitchFamily="18" charset="0"/>
                 <a:cs typeface="Calibri" panose="020F0502020204030204" pitchFamily="34" charset="0"/>
               </a:rPr>
-              <a:t>Telstra Python and Node.js Serverless Microservice development, 2023-2024 [HCL]</a:t>
+              <a:t>Telstra Python and Node.js </a:t>
+            </a:r>
+            <a:r>
+              <a:rPr lang="en-US" sz="1200" b="1" dirty="0">
+                <a:effectLst/>
+                <a:latin typeface="Calibri" panose="020F0502020204030204" pitchFamily="34" charset="0"/>
+                <a:ea typeface="Times New Roman" panose="02020603050405020304" pitchFamily="18" charset="0"/>
+                <a:cs typeface="Calibri" panose="020F0502020204030204" pitchFamily="34" charset="0"/>
+              </a:rPr>
+              <a:t>Serverless Microservice development</a:t>
+            </a:r>
+            <a:r>
+              <a:rPr lang="en-US" sz="1200" dirty="0">
+                <a:effectLst/>
+                <a:latin typeface="Calibri" panose="020F0502020204030204" pitchFamily="34" charset="0"/>
+                <a:ea typeface="Times New Roman" panose="02020603050405020304" pitchFamily="18" charset="0"/>
+                <a:cs typeface="Calibri" panose="020F0502020204030204" pitchFamily="34" charset="0"/>
+              </a:rPr>
+              <a:t>, 2023-2024 [HCL]</a:t>
             </a:r>
           </a:p>
           <a:p>
@@ -4933,7 +4976,7 @@
                 <a:ea typeface="Calibri" panose="020F0502020204030204" pitchFamily="34" charset="0"/>
                 <a:cs typeface="Calibri" panose="020F0502020204030204" pitchFamily="34" charset="0"/>
               </a:rPr>
-              <a:t>Cisco Project Timeline Management, Node.js, 2022 – 2023 [HCL]</a:t>
+              <a:t>Cisco Project Timeline Management, Node.js and React.js, 2022 – 2023 [HCL]</a:t>
             </a:r>
             <a:endParaRPr lang="en-US" sz="1200" dirty="0">
               <a:effectLst/>
@@ -5008,7 +5051,23 @@
                 <a:ea typeface="Calibri" panose="020F0502020204030204" pitchFamily="34" charset="0"/>
                 <a:cs typeface="Calibri" panose="020F0502020204030204" pitchFamily="34" charset="0"/>
               </a:rPr>
-              <a:t>, Node.js and React JS, 2021 [HCL]</a:t>
+              <a:t>, Node.js and React JS, </a:t>
+            </a:r>
+            <a:r>
+              <a:rPr lang="en-US" sz="1200" b="1" dirty="0">
+                <a:latin typeface="Calibri" panose="020F0502020204030204" pitchFamily="34" charset="0"/>
+                <a:ea typeface="Calibri" panose="020F0502020204030204" pitchFamily="34" charset="0"/>
+                <a:cs typeface="Calibri" panose="020F0502020204030204" pitchFamily="34" charset="0"/>
+              </a:rPr>
+              <a:t>Browser Apps</a:t>
+            </a:r>
+            <a:r>
+              <a:rPr lang="en-US" sz="1200" dirty="0">
+                <a:latin typeface="Calibri" panose="020F0502020204030204" pitchFamily="34" charset="0"/>
+                <a:ea typeface="Calibri" panose="020F0502020204030204" pitchFamily="34" charset="0"/>
+                <a:cs typeface="Calibri" panose="020F0502020204030204" pitchFamily="34" charset="0"/>
+              </a:rPr>
+              <a:t> Chrome/Firefox, 2021 [HCL]</a:t>
             </a:r>
             <a:endParaRPr lang="en-US" sz="1200" dirty="0">
               <a:effectLst/>
@@ -5032,7 +5091,60 @@
                 <a:ea typeface="Times New Roman" panose="02020603050405020304" pitchFamily="18" charset="0"/>
                 <a:cs typeface="Calibri" panose="020F0502020204030204" pitchFamily="34" charset="0"/>
               </a:rPr>
-              <a:t>Mitel Premium Attendant application, Node.js and Angular application, Technical Lead, 2016-2021 [</a:t>
+              <a:t>Mitel Premium Attendant, NextGen and </a:t>
+            </a:r>
+            <a:r>
+              <a:rPr lang="en-US" sz="1200" dirty="0" err="1">
+                <a:effectLst/>
+                <a:latin typeface="Calibri" panose="020F0502020204030204" pitchFamily="34" charset="0"/>
+                <a:ea typeface="Times New Roman" panose="02020603050405020304" pitchFamily="18" charset="0"/>
+                <a:cs typeface="Calibri" panose="020F0502020204030204" pitchFamily="34" charset="0"/>
+              </a:rPr>
+              <a:t>MiShare</a:t>
+            </a:r>
+            <a:r>
+              <a:rPr lang="en-US" sz="1200" dirty="0">
+                <a:effectLst/>
+                <a:latin typeface="Calibri" panose="020F0502020204030204" pitchFamily="34" charset="0"/>
+                <a:ea typeface="Times New Roman" panose="02020603050405020304" pitchFamily="18" charset="0"/>
+                <a:cs typeface="Calibri" panose="020F0502020204030204" pitchFamily="34" charset="0"/>
+              </a:rPr>
+              <a:t> application, Electron JS, Node.js, Angular, </a:t>
+            </a:r>
+            <a:r>
+              <a:rPr lang="en-US" sz="1200" b="1" dirty="0" err="1">
+                <a:latin typeface="Calibri" panose="020F0502020204030204" pitchFamily="34" charset="0"/>
+                <a:ea typeface="Times New Roman" panose="02020603050405020304" pitchFamily="18" charset="0"/>
+                <a:cs typeface="Calibri" panose="020F0502020204030204" pitchFamily="34" charset="0"/>
+              </a:rPr>
+              <a:t>F</a:t>
+            </a:r>
+            <a:r>
+              <a:rPr lang="en-US" sz="1200" b="1" dirty="0" err="1">
+                <a:effectLst/>
+                <a:latin typeface="Calibri" panose="020F0502020204030204" pitchFamily="34" charset="0"/>
+                <a:ea typeface="Times New Roman" panose="02020603050405020304" pitchFamily="18" charset="0"/>
+                <a:cs typeface="Calibri" panose="020F0502020204030204" pitchFamily="34" charset="0"/>
+              </a:rPr>
+              <a:t>ullstack</a:t>
+            </a:r>
+            <a:r>
+              <a:rPr lang="en-US" sz="1200" b="1" dirty="0">
+                <a:effectLst/>
+                <a:latin typeface="Calibri" panose="020F0502020204030204" pitchFamily="34" charset="0"/>
+                <a:ea typeface="Times New Roman" panose="02020603050405020304" pitchFamily="18" charset="0"/>
+                <a:cs typeface="Calibri" panose="020F0502020204030204" pitchFamily="34" charset="0"/>
+              </a:rPr>
+              <a:t> application and Desktop applications </a:t>
+            </a:r>
+            <a:r>
+              <a:rPr lang="en-US" sz="1200" dirty="0">
+                <a:effectLst/>
+                <a:latin typeface="Calibri" panose="020F0502020204030204" pitchFamily="34" charset="0"/>
+                <a:ea typeface="Times New Roman" panose="02020603050405020304" pitchFamily="18" charset="0"/>
+                <a:cs typeface="Calibri" panose="020F0502020204030204" pitchFamily="34" charset="0"/>
+              </a:rPr>
+              <a:t>Mac OS/Windows, Technical Lead, 2016-2021 [</a:t>
             </a:r>
             <a:r>
               <a:rPr lang="en-US" sz="1200" dirty="0">
@@ -5082,25 +5194,7 @@
                 <a:ea typeface="Times New Roman" panose="02020603050405020304" pitchFamily="18" charset="0"/>
                 <a:cs typeface="Calibri" panose="020F0502020204030204" pitchFamily="34" charset="0"/>
               </a:rPr>
-              <a:t>, Hybrid Application </a:t>
-            </a:r>
-            <a:r>
-              <a:rPr lang="en-US" sz="1200" dirty="0" err="1">
-                <a:effectLst/>
-                <a:latin typeface="Calibri" panose="020F0502020204030204" pitchFamily="34" charset="0"/>
-                <a:ea typeface="Times New Roman" panose="02020603050405020304" pitchFamily="18" charset="0"/>
-                <a:cs typeface="Calibri" panose="020F0502020204030204" pitchFamily="34" charset="0"/>
-              </a:rPr>
-              <a:t>developement</a:t>
-            </a:r>
-            <a:r>
-              <a:rPr lang="en-US" sz="1200" dirty="0">
-                <a:effectLst/>
-                <a:latin typeface="Calibri" panose="020F0502020204030204" pitchFamily="34" charset="0"/>
-                <a:ea typeface="Times New Roman" panose="02020603050405020304" pitchFamily="18" charset="0"/>
-                <a:cs typeface="Calibri" panose="020F0502020204030204" pitchFamily="34" charset="0"/>
-              </a:rPr>
-              <a:t>, 2016</a:t>
+              <a:t>, Hybrid Application development for iOS/Android 8/Blackberry, 2016</a:t>
             </a:r>
             <a:r>
               <a:rPr lang="en-US" sz="1200" dirty="0">
@@ -5151,7 +5245,39 @@
                 <a:ea typeface="Calibri" panose="020F0502020204030204" pitchFamily="34" charset="0"/>
                 <a:cs typeface="Calibri" panose="020F0502020204030204" pitchFamily="34" charset="0"/>
               </a:rPr>
-              <a:t>Expedia, Angular IONIC and Cordova Hybrid Application Development, 2015-2016, [Refine Interactive Pvt. Ltd.]</a:t>
+              <a:t>Expedia, Angular IONIC and Cordova </a:t>
+            </a:r>
+            <a:r>
+              <a:rPr lang="en-US" sz="1200" b="1" dirty="0">
+                <a:latin typeface="Calibri" panose="020F0502020204030204" pitchFamily="34" charset="0"/>
+                <a:ea typeface="Calibri" panose="020F0502020204030204" pitchFamily="34" charset="0"/>
+                <a:cs typeface="Calibri" panose="020F0502020204030204" pitchFamily="34" charset="0"/>
+              </a:rPr>
+              <a:t>Hybrid Application</a:t>
+            </a:r>
+            <a:r>
+              <a:rPr lang="en-US" sz="1200" dirty="0">
+                <a:latin typeface="Calibri" panose="020F0502020204030204" pitchFamily="34" charset="0"/>
+                <a:ea typeface="Calibri" panose="020F0502020204030204" pitchFamily="34" charset="0"/>
+                <a:cs typeface="Calibri" panose="020F0502020204030204" pitchFamily="34" charset="0"/>
+              </a:rPr>
+              <a:t> Development iOS/</a:t>
+            </a:r>
+            <a:r>
+              <a:rPr lang="en-US" sz="1200" dirty="0" err="1">
+                <a:latin typeface="Calibri" panose="020F0502020204030204" pitchFamily="34" charset="0"/>
+                <a:ea typeface="Calibri" panose="020F0502020204030204" pitchFamily="34" charset="0"/>
+                <a:cs typeface="Calibri" panose="020F0502020204030204" pitchFamily="34" charset="0"/>
+              </a:rPr>
+              <a:t>Androd</a:t>
+            </a:r>
+            <a:r>
+              <a:rPr lang="en-US" sz="1200" dirty="0">
+                <a:latin typeface="Calibri" panose="020F0502020204030204" pitchFamily="34" charset="0"/>
+                <a:ea typeface="Calibri" panose="020F0502020204030204" pitchFamily="34" charset="0"/>
+                <a:cs typeface="Calibri" panose="020F0502020204030204" pitchFamily="34" charset="0"/>
+              </a:rPr>
+              <a:t>, 2015-2016, [Refine Interactive]</a:t>
             </a:r>
           </a:p>
           <a:p>
@@ -5184,15 +5310,39 @@
                 <a:ea typeface="Calibri" panose="020F0502020204030204" pitchFamily="34" charset="0"/>
                 <a:cs typeface="Calibri" panose="020F0502020204030204" pitchFamily="34" charset="0"/>
               </a:rPr>
-              <a:t> development for domestic India Clients, </a:t>
-            </a:r>
-            <a:r>
-              <a:rPr lang="en-US" sz="1200">
+              <a:t>/Angular/Node.js/</a:t>
+            </a:r>
+            <a:r>
+              <a:rPr lang="en-US" sz="1200" dirty="0" err="1">
                 <a:latin typeface="Calibri" panose="020F0502020204030204" pitchFamily="34" charset="0"/>
                 <a:ea typeface="Calibri" panose="020F0502020204030204" pitchFamily="34" charset="0"/>
                 <a:cs typeface="Calibri" panose="020F0502020204030204" pitchFamily="34" charset="0"/>
               </a:rPr>
-              <a:t>2011-2015, [ </a:t>
+              <a:t>Jquery</a:t>
+            </a:r>
+            <a:r>
+              <a:rPr lang="en-US" sz="1200" b="1" dirty="0" err="1">
+                <a:latin typeface="Calibri" panose="020F0502020204030204" pitchFamily="34" charset="0"/>
+                <a:ea typeface="Calibri" panose="020F0502020204030204" pitchFamily="34" charset="0"/>
+                <a:cs typeface="Calibri" panose="020F0502020204030204" pitchFamily="34" charset="0"/>
+              </a:rPr>
+              <a:t>Mobile</a:t>
+            </a:r>
+            <a:r>
+              <a:rPr lang="en-US" sz="1200" b="1" dirty="0">
+                <a:latin typeface="Calibri" panose="020F0502020204030204" pitchFamily="34" charset="0"/>
+                <a:ea typeface="Calibri" panose="020F0502020204030204" pitchFamily="34" charset="0"/>
+                <a:cs typeface="Calibri" panose="020F0502020204030204" pitchFamily="34" charset="0"/>
+              </a:rPr>
+              <a:t> development</a:t>
+            </a:r>
+            <a:r>
+              <a:rPr lang="en-US" sz="1200" dirty="0">
+                <a:latin typeface="Calibri" panose="020F0502020204030204" pitchFamily="34" charset="0"/>
+                <a:ea typeface="Calibri" panose="020F0502020204030204" pitchFamily="34" charset="0"/>
+                <a:cs typeface="Calibri" panose="020F0502020204030204" pitchFamily="34" charset="0"/>
+              </a:rPr>
+              <a:t> for domestic India Clients, 2011-2015, [ </a:t>
             </a:r>
             <a:r>
               <a:rPr lang="en-US" sz="1200" dirty="0" err="1">

</xml_diff>

<commit_message>
PROFILE UPDATE WITH 2024 CHANGES
</commit_message>
<xml_diff>
--- a/p/pro/Ranjan-Sharma-Profile V 1.0.pptx
+++ b/p/pro/Ranjan-Sharma-Profile V 1.0.pptx
@@ -197,7 +197,7 @@
           <a:p>
             <a:fld id="{81255D54-DCC7-4AEA-9A0D-ADE65BFAD0FD}" type="datetimeFigureOut">
               <a:rPr lang="en-US" smtClean="0"/>
-              <a:t>9/9/2024</a:t>
+              <a:t>9/10/2024</a:t>
             </a:fld>
             <a:endParaRPr lang="en-US"/>
           </a:p>
@@ -695,7 +695,7 @@
           <a:p>
             <a:fld id="{92AA035B-E45D-4D8B-A5AD-8F56B5D9C378}" type="datetimeFigureOut">
               <a:rPr lang="en-US" smtClean="0"/>
-              <a:t>9/9/2024</a:t>
+              <a:t>9/10/2024</a:t>
             </a:fld>
             <a:endParaRPr lang="en-US"/>
           </a:p>
@@ -893,7 +893,7 @@
           <a:p>
             <a:fld id="{92AA035B-E45D-4D8B-A5AD-8F56B5D9C378}" type="datetimeFigureOut">
               <a:rPr lang="en-US" smtClean="0"/>
-              <a:t>9/9/2024</a:t>
+              <a:t>9/10/2024</a:t>
             </a:fld>
             <a:endParaRPr lang="en-US"/>
           </a:p>
@@ -1101,7 +1101,7 @@
           <a:p>
             <a:fld id="{92AA035B-E45D-4D8B-A5AD-8F56B5D9C378}" type="datetimeFigureOut">
               <a:rPr lang="en-US" smtClean="0"/>
-              <a:t>9/9/2024</a:t>
+              <a:t>9/10/2024</a:t>
             </a:fld>
             <a:endParaRPr lang="en-US"/>
           </a:p>
@@ -1299,7 +1299,7 @@
           <a:p>
             <a:fld id="{92AA035B-E45D-4D8B-A5AD-8F56B5D9C378}" type="datetimeFigureOut">
               <a:rPr lang="en-US" smtClean="0"/>
-              <a:t>9/9/2024</a:t>
+              <a:t>9/10/2024</a:t>
             </a:fld>
             <a:endParaRPr lang="en-US"/>
           </a:p>
@@ -1574,7 +1574,7 @@
           <a:p>
             <a:fld id="{92AA035B-E45D-4D8B-A5AD-8F56B5D9C378}" type="datetimeFigureOut">
               <a:rPr lang="en-US" smtClean="0"/>
-              <a:t>9/9/2024</a:t>
+              <a:t>9/10/2024</a:t>
             </a:fld>
             <a:endParaRPr lang="en-US"/>
           </a:p>
@@ -1839,7 +1839,7 @@
           <a:p>
             <a:fld id="{92AA035B-E45D-4D8B-A5AD-8F56B5D9C378}" type="datetimeFigureOut">
               <a:rPr lang="en-US" smtClean="0"/>
-              <a:t>9/9/2024</a:t>
+              <a:t>9/10/2024</a:t>
             </a:fld>
             <a:endParaRPr lang="en-US"/>
           </a:p>
@@ -2251,7 +2251,7 @@
           <a:p>
             <a:fld id="{92AA035B-E45D-4D8B-A5AD-8F56B5D9C378}" type="datetimeFigureOut">
               <a:rPr lang="en-US" smtClean="0"/>
-              <a:t>9/9/2024</a:t>
+              <a:t>9/10/2024</a:t>
             </a:fld>
             <a:endParaRPr lang="en-US"/>
           </a:p>
@@ -2392,7 +2392,7 @@
           <a:p>
             <a:fld id="{92AA035B-E45D-4D8B-A5AD-8F56B5D9C378}" type="datetimeFigureOut">
               <a:rPr lang="en-US" smtClean="0"/>
-              <a:t>9/9/2024</a:t>
+              <a:t>9/10/2024</a:t>
             </a:fld>
             <a:endParaRPr lang="en-US"/>
           </a:p>
@@ -2505,7 +2505,7 @@
           <a:p>
             <a:fld id="{92AA035B-E45D-4D8B-A5AD-8F56B5D9C378}" type="datetimeFigureOut">
               <a:rPr lang="en-US" smtClean="0"/>
-              <a:t>9/9/2024</a:t>
+              <a:t>9/10/2024</a:t>
             </a:fld>
             <a:endParaRPr lang="en-US"/>
           </a:p>
@@ -2816,7 +2816,7 @@
           <a:p>
             <a:fld id="{92AA035B-E45D-4D8B-A5AD-8F56B5D9C378}" type="datetimeFigureOut">
               <a:rPr lang="en-US" smtClean="0"/>
-              <a:t>9/9/2024</a:t>
+              <a:t>9/10/2024</a:t>
             </a:fld>
             <a:endParaRPr lang="en-US"/>
           </a:p>
@@ -3104,7 +3104,7 @@
           <a:p>
             <a:fld id="{92AA035B-E45D-4D8B-A5AD-8F56B5D9C378}" type="datetimeFigureOut">
               <a:rPr lang="en-US" smtClean="0"/>
-              <a:t>9/9/2024</a:t>
+              <a:t>9/10/2024</a:t>
             </a:fld>
             <a:endParaRPr lang="en-US"/>
           </a:p>
@@ -3345,7 +3345,7 @@
           <a:p>
             <a:fld id="{92AA035B-E45D-4D8B-A5AD-8F56B5D9C378}" type="datetimeFigureOut">
               <a:rPr lang="en-US" smtClean="0"/>
-              <a:t>9/9/2024</a:t>
+              <a:t>9/10/2024</a:t>
             </a:fld>
             <a:endParaRPr lang="en-US"/>
           </a:p>
@@ -4548,12 +4548,53 @@
               <a:buChar char="•"/>
             </a:pPr>
             <a:r>
+              <a:rPr lang="en-US" sz="1200" b="1" dirty="0">
+                <a:latin typeface="Calibri" panose="020F0502020204030204" pitchFamily="34" charset="0"/>
+                <a:ea typeface="Times New Roman" panose="02020603050405020304" pitchFamily="18" charset="0"/>
+                <a:cs typeface="Calibri" panose="020F0502020204030204" pitchFamily="34" charset="0"/>
+              </a:rPr>
+              <a:t>Achievement awards for innovation</a:t>
+            </a:r>
+            <a:r>
               <a:rPr lang="en-US" sz="1200" dirty="0">
                 <a:latin typeface="Calibri" panose="020F0502020204030204" pitchFamily="34" charset="0"/>
                 <a:ea typeface="Times New Roman" panose="02020603050405020304" pitchFamily="18" charset="0"/>
                 <a:cs typeface="Calibri" panose="020F0502020204030204" pitchFamily="34" charset="0"/>
               </a:rPr>
-              <a:t>Strong experience in developing serverless microservices architecture.</a:t>
+              <a:t>, project and technology timeline at </a:t>
+            </a:r>
+            <a:r>
+              <a:rPr lang="en-US" sz="1200" b="1" dirty="0">
+                <a:latin typeface="Calibri" panose="020F0502020204030204" pitchFamily="34" charset="0"/>
+                <a:ea typeface="Times New Roman" panose="02020603050405020304" pitchFamily="18" charset="0"/>
+                <a:cs typeface="Calibri" panose="020F0502020204030204" pitchFamily="34" charset="0"/>
+                <a:hlinkClick r:id="rId6"/>
+              </a:rPr>
+              <a:t>link</a:t>
+            </a:r>
+            <a:r>
+              <a:rPr lang="en-US" sz="1200" dirty="0">
+                <a:latin typeface="Calibri" panose="020F0502020204030204" pitchFamily="34" charset="0"/>
+                <a:ea typeface="Times New Roman" panose="02020603050405020304" pitchFamily="18" charset="0"/>
+                <a:cs typeface="Calibri" panose="020F0502020204030204" pitchFamily="34" charset="0"/>
+              </a:rPr>
+              <a:t> (access for </a:t>
+            </a:r>
+            <a:r>
+              <a:rPr lang="en-US" sz="1200" dirty="0" err="1">
+                <a:latin typeface="Calibri" panose="020F0502020204030204" pitchFamily="34" charset="0"/>
+                <a:ea typeface="Times New Roman" panose="02020603050405020304" pitchFamily="18" charset="0"/>
+                <a:cs typeface="Calibri" panose="020F0502020204030204" pitchFamily="34" charset="0"/>
+              </a:rPr>
+              <a:t>HCLTech</a:t>
+            </a:r>
+            <a:r>
+              <a:rPr lang="en-US" sz="1200" dirty="0">
+                <a:latin typeface="Calibri" panose="020F0502020204030204" pitchFamily="34" charset="0"/>
+                <a:ea typeface="Times New Roman" panose="02020603050405020304" pitchFamily="18" charset="0"/>
+                <a:cs typeface="Calibri" panose="020F0502020204030204" pitchFamily="34" charset="0"/>
+              </a:rPr>
+              <a:t> employees only)</a:t>
             </a:r>
           </a:p>
           <a:p>
@@ -6425,11 +6466,11 @@
           <p:nvPr/>
         </p:nvPicPr>
         <p:blipFill>
-          <a:blip r:embed="rId6">
+          <a:blip r:embed="rId7">
             <a:extLst>
               <a:ext uri="{BEBA8EAE-BF5A-486C-A8C5-ECC9F3942E4B}">
                 <a14:imgProps xmlns:a14="http://schemas.microsoft.com/office/drawing/2010/main">
-                  <a14:imgLayer r:embed="rId7">
+                  <a14:imgLayer r:embed="rId8">
                     <a14:imgEffect>
                       <a14:backgroundRemoval t="8871" b="99194" l="5618" r="96629">
                         <a14:foregroundMark x1="5618" y1="95968" x2="5618" y2="95968"/>

</xml_diff>